<commit_message>
TOM 10 Alles Tomate
Für Promotion überarbeitet...fast nichts verändert ;-)
</commit_message>
<xml_diff>
--- a/training-cards/music moves/Tomatoes (TOM)/ger/apprentice/ger_TOM_10_Alles_Tomate_MM_A.pptx
+++ b/training-cards/music moves/Tomatoes (TOM)/ger/apprentice/ger_TOM_10_Alles_Tomate_MM_A.pptx
@@ -105,6 +105,22 @@
       </a:defRPr>
     </a:lvl9pPr>
   </p:defaultTextStyle>
+  <p:extLst>
+    <p:ext uri="{EFAFB233-063F-42B5-8137-9DF3F51BA10A}">
+      <p15:sldGuideLst xmlns:p15="http://schemas.microsoft.com/office/powerpoint/2012/main">
+        <p15:guide id="1" orient="horz" pos="872">
+          <p15:clr>
+            <a:srgbClr val="A4A3A4"/>
+          </p15:clr>
+        </p15:guide>
+        <p15:guide id="2" pos="735">
+          <p15:clr>
+            <a:srgbClr val="A4A3A4"/>
+          </p15:clr>
+        </p15:guide>
+      </p15:sldGuideLst>
+    </p:ext>
+  </p:extLst>
 </p:presentation>
 </file>
 
@@ -150,7 +166,7 @@
           </a:lstStyle>
           <a:p>
             <a:r>
-              <a:rPr lang="de-DE" smtClean="0"/>
+              <a:rPr lang="de-DE"/>
               <a:t>Mastertitelformat bearbeiten</a:t>
             </a:r>
             <a:endParaRPr lang="de-DE" dirty="0"/>
@@ -271,7 +287,7 @@
           </a:lstStyle>
           <a:p>
             <a:r>
-              <a:rPr lang="de-DE" smtClean="0"/>
+              <a:rPr lang="de-DE"/>
               <a:t>Master-Untertitelformat bearbeiten</a:t>
             </a:r>
             <a:endParaRPr lang="de-DE" dirty="0"/>
@@ -305,35 +321,35 @@
           <a:p>
             <a:pPr lvl="0"/>
             <a:r>
-              <a:rPr lang="de-DE" smtClean="0"/>
+              <a:rPr lang="de-DE"/>
               <a:t>Mastertextformat bearbeiten</a:t>
             </a:r>
           </a:p>
           <a:p>
             <a:pPr lvl="1"/>
             <a:r>
-              <a:rPr lang="de-DE" smtClean="0"/>
+              <a:rPr lang="de-DE"/>
               <a:t>Zweite Ebene</a:t>
             </a:r>
           </a:p>
           <a:p>
             <a:pPr lvl="2"/>
             <a:r>
-              <a:rPr lang="de-DE" smtClean="0"/>
+              <a:rPr lang="de-DE"/>
               <a:t>Dritte Ebene</a:t>
             </a:r>
           </a:p>
           <a:p>
             <a:pPr lvl="3"/>
             <a:r>
-              <a:rPr lang="de-DE" smtClean="0"/>
+              <a:rPr lang="de-DE"/>
               <a:t>Vierte Ebene</a:t>
             </a:r>
           </a:p>
           <a:p>
             <a:pPr lvl="4"/>
             <a:r>
-              <a:rPr lang="de-DE" smtClean="0"/>
+              <a:rPr lang="de-DE"/>
               <a:t>Fünfte Ebene</a:t>
             </a:r>
             <a:endParaRPr lang="de-DE" dirty="0"/>
@@ -381,7 +397,7 @@
           <a:p>
             <a:pPr algn="l"/>
             <a:r>
-              <a:rPr lang="de-DE" sz="1000" dirty="0" smtClean="0">
+              <a:rPr lang="de-DE" sz="1000" dirty="0">
                 <a:solidFill>
                   <a:srgbClr val="5D5E5F"/>
                 </a:solidFill>
@@ -391,7 +407,7 @@
               <a:t>REGINA</a:t>
             </a:r>
             <a:r>
-              <a:rPr lang="de-DE" sz="1000" baseline="0" dirty="0" smtClean="0">
+              <a:rPr lang="de-DE" sz="1000" baseline="0" dirty="0">
                 <a:solidFill>
                   <a:srgbClr val="5D5E5F"/>
                 </a:solidFill>
@@ -401,7 +417,7 @@
               <a:t> BRANDHUBER</a:t>
             </a:r>
             <a:r>
-              <a:rPr lang="de-DE" sz="1000" dirty="0" smtClean="0">
+              <a:rPr lang="de-DE" sz="1000" dirty="0">
                 <a:solidFill>
                   <a:srgbClr val="5D5E5F"/>
                 </a:solidFill>
@@ -410,13 +426,6 @@
               </a:rPr>
               <a:t> </a:t>
             </a:r>
-            <a:endParaRPr lang="de-DE" sz="1000" dirty="0">
-              <a:solidFill>
-                <a:srgbClr val="5D5E5F"/>
-              </a:solidFill>
-              <a:latin typeface="Avenir Book"/>
-              <a:cs typeface="Avenir Book"/>
-            </a:endParaRPr>
           </a:p>
         </p:txBody>
       </p:sp>
@@ -529,35 +538,35 @@
           <a:p>
             <a:pPr lvl="0"/>
             <a:r>
-              <a:rPr lang="de-DE" smtClean="0"/>
+              <a:rPr lang="de-DE"/>
               <a:t>Mastertextformat bearbeiten</a:t>
             </a:r>
           </a:p>
           <a:p>
             <a:pPr lvl="1"/>
             <a:r>
-              <a:rPr lang="de-DE" smtClean="0"/>
+              <a:rPr lang="de-DE"/>
               <a:t>Zweite Ebene</a:t>
             </a:r>
           </a:p>
           <a:p>
             <a:pPr lvl="2"/>
             <a:r>
-              <a:rPr lang="de-DE" smtClean="0"/>
+              <a:rPr lang="de-DE"/>
               <a:t>Dritte Ebene</a:t>
             </a:r>
           </a:p>
           <a:p>
             <a:pPr lvl="3"/>
             <a:r>
-              <a:rPr lang="de-DE" smtClean="0"/>
+              <a:rPr lang="de-DE"/>
               <a:t>Vierte Ebene</a:t>
             </a:r>
           </a:p>
           <a:p>
             <a:pPr lvl="4"/>
             <a:r>
-              <a:rPr lang="de-DE" smtClean="0"/>
+              <a:rPr lang="de-DE"/>
               <a:t>Fünfte Ebene</a:t>
             </a:r>
             <a:endParaRPr lang="de-DE" dirty="0"/>
@@ -587,7 +596,7 @@
           <a:lstStyle/>
           <a:p>
             <a:r>
-              <a:rPr lang="de-DE" sz="2400" dirty="0" smtClean="0">
+              <a:rPr lang="de-DE" sz="2400" dirty="0">
                 <a:solidFill>
                   <a:srgbClr val="7E006B"/>
                 </a:solidFill>
@@ -597,7 +606,7 @@
               <a:t>TR	AININGS</a:t>
             </a:r>
             <a:r>
-              <a:rPr lang="de-DE" sz="2400" dirty="0" smtClean="0">
+              <a:rPr lang="de-DE" sz="2400" dirty="0">
                 <a:solidFill>
                   <a:srgbClr val="7E006B"/>
                 </a:solidFill>
@@ -692,10 +701,9 @@
           <a:lstStyle/>
           <a:p>
             <a:r>
-              <a:rPr lang="de-DE" smtClean="0"/>
+              <a:rPr lang="de-DE"/>
               <a:t>Mastertitelformat bearbeiten</a:t>
             </a:r>
-            <a:endParaRPr lang="de-DE"/>
           </a:p>
         </p:txBody>
       </p:sp>
@@ -716,7 +724,7 @@
           <a:p>
             <a:fld id="{FF5B2BAF-DF38-0A48-A798-0C06E514FD52}" type="datetimeFigureOut">
               <a:rPr lang="de-DE" smtClean="0"/>
-              <a:t>12.08.15</a:t>
+              <a:t>12.09.18</a:t>
             </a:fld>
             <a:endParaRPr lang="de-DE" dirty="0"/>
           </a:p>
@@ -827,10 +835,9 @@
           <a:p>
             <a:pPr marL="0" lvl="0" algn="l"/>
             <a:r>
-              <a:rPr lang="de-DE" dirty="0" smtClean="0"/>
+              <a:rPr lang="de-DE" dirty="0"/>
               <a:t>Überschrift bearbeiten </a:t>
             </a:r>
-            <a:endParaRPr lang="de-DE" dirty="0"/>
           </a:p>
         </p:txBody>
       </p:sp>
@@ -861,38 +868,37 @@
           <a:p>
             <a:pPr lvl="0"/>
             <a:r>
-              <a:rPr lang="de-DE" dirty="0" smtClean="0"/>
+              <a:rPr lang="de-DE" dirty="0"/>
               <a:t>Mastertextformat bearbeiten</a:t>
             </a:r>
           </a:p>
           <a:p>
             <a:pPr lvl="1"/>
             <a:r>
-              <a:rPr lang="de-DE" dirty="0" smtClean="0"/>
+              <a:rPr lang="de-DE" dirty="0"/>
               <a:t>Zweite Ebene</a:t>
             </a:r>
           </a:p>
           <a:p>
             <a:pPr lvl="2"/>
             <a:r>
-              <a:rPr lang="de-DE" dirty="0" smtClean="0"/>
+              <a:rPr lang="de-DE" dirty="0"/>
               <a:t>Dritte Ebene</a:t>
             </a:r>
           </a:p>
           <a:p>
             <a:pPr lvl="3"/>
             <a:r>
-              <a:rPr lang="de-DE" dirty="0" smtClean="0"/>
+              <a:rPr lang="de-DE" dirty="0"/>
               <a:t>Vierte Ebene</a:t>
             </a:r>
           </a:p>
           <a:p>
             <a:pPr lvl="4"/>
             <a:r>
-              <a:rPr lang="de-DE" dirty="0" smtClean="0"/>
+              <a:rPr lang="de-DE" dirty="0"/>
               <a:t>Fünfte Ebene</a:t>
             </a:r>
-            <a:endParaRPr lang="de-DE" dirty="0"/>
           </a:p>
         </p:txBody>
       </p:sp>
@@ -931,7 +937,7 @@
           <a:p>
             <a:fld id="{FF5B2BAF-DF38-0A48-A798-0C06E514FD52}" type="datetimeFigureOut">
               <a:rPr lang="de-DE" smtClean="0"/>
-              <a:t>12.08.15</a:t>
+              <a:t>12.09.18</a:t>
             </a:fld>
             <a:endParaRPr lang="de-DE" dirty="0"/>
           </a:p>
@@ -1165,7 +1171,7 @@
           <a:lstStyle/>
           <a:p>
             <a:r>
-              <a:rPr lang="de-DE" sz="1050" b="1" dirty="0" smtClean="0">
+              <a:rPr lang="de-DE" sz="1050" b="1" dirty="0">
                 <a:solidFill>
                   <a:schemeClr val="bg1"/>
                 </a:solidFill>
@@ -1175,7 +1181,7 @@
               <a:t>TRAININGSKARTE</a:t>
             </a:r>
             <a:r>
-              <a:rPr lang="de-DE" sz="1050" dirty="0" smtClean="0">
+              <a:rPr lang="de-DE" sz="1050" dirty="0">
                 <a:solidFill>
                   <a:schemeClr val="bg1"/>
                 </a:solidFill>
@@ -1185,7 +1191,7 @@
               <a:t> </a:t>
             </a:r>
             <a:r>
-              <a:rPr lang="de-DE" sz="1050" b="1" dirty="0" smtClean="0">
+              <a:rPr lang="de-DE" sz="1050" b="1" dirty="0">
                 <a:solidFill>
                   <a:schemeClr val="bg1"/>
                 </a:solidFill>
@@ -1194,13 +1200,6 @@
               </a:rPr>
               <a:t>TOM 10</a:t>
             </a:r>
-            <a:endParaRPr lang="de-DE" sz="1050" b="1" dirty="0">
-              <a:solidFill>
-                <a:schemeClr val="bg1"/>
-              </a:solidFill>
-              <a:latin typeface="Avenir Heavy"/>
-              <a:cs typeface="Avenir Heavy"/>
-            </a:endParaRPr>
           </a:p>
         </p:txBody>
       </p:sp>
@@ -1583,20 +1582,16 @@
           <a:lstStyle/>
           <a:p>
             <a:r>
-              <a:rPr lang="de-DE" dirty="0" smtClean="0"/>
+              <a:rPr lang="de-DE" dirty="0"/>
               <a:t>ALLES </a:t>
             </a:r>
             <a:r>
-              <a:rPr lang="de-DE" dirty="0" smtClean="0">
+              <a:rPr lang="de-DE" dirty="0">
                 <a:latin typeface="Avenir Book"/>
                 <a:cs typeface="Avenir Book"/>
               </a:rPr>
               <a:t>TOMATE</a:t>
             </a:r>
-            <a:endParaRPr lang="de-DE" dirty="0">
-              <a:latin typeface="Avenir Book"/>
-              <a:cs typeface="Avenir Book"/>
-            </a:endParaRPr>
           </a:p>
         </p:txBody>
       </p:sp>
@@ -1623,24 +1618,8 @@
               </a:spcBef>
             </a:pPr>
             <a:r>
-              <a:rPr lang="de-DE" sz="1050" dirty="0" smtClean="0"/>
-              <a:t>Wie viele Tomaten</a:t>
-            </a:r>
-            <a:r>
-              <a:rPr lang="de-DE" sz="1050" dirty="0" smtClean="0"/>
-              <a:t> </a:t>
-            </a:r>
-            <a:r>
               <a:rPr lang="de-DE" sz="1050" dirty="0"/>
-              <a:t>schaffe ich an einem Tag? Mit welchem Tagespensum fühle ich mich überfordert? </a:t>
-            </a:r>
-            <a:r>
-              <a:rPr lang="de-DE" sz="1050" dirty="0" smtClean="0"/>
-              <a:t>Wann </a:t>
-            </a:r>
-            <a:r>
-              <a:rPr lang="de-DE" sz="1050" dirty="0"/>
-              <a:t>wird es langweilig?</a:t>
+              <a:t>Wie viele Tomaten schaffe ich an einem Tag? Mit welchem Tagespensum fühle ich mich überfordert? Wann wird es langweilig?</a:t>
             </a:r>
           </a:p>
           <a:p>
@@ -1651,7 +1630,7 @@
             </a:pPr>
             <a:r>
               <a:rPr lang="de-DE" sz="1050" dirty="0"/>
-              <a:t>Ein Tagesplan, den Du auf Tomaten herunterbrichst (siehe TOM-01), hilft Dir eine Wahrnehmung zu entwickeln, wie viele konzentrierte Tomaten Du an einem Tag schaffen kannst. Er fordert Dich auf Dir zu überlegen, was Du machen magst (siehe Tagesvisionskarte VIS-03). Wofür bist du heute aufgestanden? Wie viel davon kannst du umsetzen?</a:t>
+              <a:t>Ein Tagesplan, den Du auf Tomaten herunterbrichst (siehe TOM 01), hilft Dir eine Wahrnehmung zu entwickeln, wie viele konzentrierte Tomaten Du an einem Tag schaffen kannst. Er fordert Dich auf Dir zu überlegen, was Du machen magst. Wofür bist du heute aufgestanden? Wie viel davon kannst du umsetzen?</a:t>
             </a:r>
           </a:p>
           <a:p>
@@ -1662,7 +1641,7 @@
             </a:pPr>
             <a:r>
               <a:rPr lang="de-DE" sz="1050" dirty="0"/>
-              <a:t>Wenn Du vor Deinem Tagwerk beginnst zu planen und danach reflektierst, was du geschafft hast, bekommst Du mit der Zeit ein Gefühl, welches Pensum Dir hilft, Dich und Deine Vision zu entwickeln.</a:t>
+              <a:t>Wenn Du vor Deinem Tagwerk beginnst zu planen und danach reflektierst, was du geschafft hast, bekommst Du mit der Zeit ein Gefühl, welches Pensum Dir hilft, Dich und Deine Ziele zu entwickeln.</a:t>
             </a:r>
           </a:p>
           <a:p>
@@ -1695,45 +1674,8 @@
             </a:pPr>
             <a:r>
               <a:rPr lang="de-DE" sz="1050" dirty="0"/>
-              <a:t>Wenn du Anfänger bist, kannst Du mit </a:t>
-            </a:r>
-            <a:r>
-              <a:rPr lang="de-DE" sz="1050" dirty="0"/>
-              <a:t>2</a:t>
-            </a:r>
-            <a:r>
-              <a:rPr lang="de-DE" sz="1050" dirty="0" smtClean="0"/>
-              <a:t> </a:t>
-            </a:r>
-            <a:r>
-              <a:rPr lang="de-DE" sz="1050" dirty="0"/>
-              <a:t>Tomaten pro Tag beginnen und Dich später auf bis zu </a:t>
-            </a:r>
-            <a:r>
-              <a:rPr lang="de-DE" sz="1050" dirty="0"/>
-              <a:t>8</a:t>
-            </a:r>
-            <a:r>
-              <a:rPr lang="de-DE" sz="1050" dirty="0" smtClean="0"/>
-              <a:t> oder </a:t>
-            </a:r>
-            <a:r>
-              <a:rPr lang="de-DE" sz="1050" dirty="0" smtClean="0"/>
-              <a:t>10</a:t>
-            </a:r>
-            <a:r>
-              <a:rPr lang="de-DE" sz="1050" dirty="0" smtClean="0"/>
-              <a:t> </a:t>
-            </a:r>
-            <a:r>
-              <a:rPr lang="de-DE" sz="1050" dirty="0"/>
-              <a:t>Tomaten zu je 25 Minuten steigern</a:t>
-            </a:r>
-            <a:r>
-              <a:rPr lang="de-DE" sz="1050" dirty="0" smtClean="0"/>
-              <a:t>.</a:t>
-            </a:r>
-            <a:endParaRPr lang="de-DE" sz="1050" dirty="0"/>
+              <a:t>Richtwerte aus der Erfahrung: Als Anfänger kannst Du mit 2 Tomaten pro Tag beginnen und Dich später auf bis zu 8 oder 10 Tomaten zu je 25 Minuten steigern.</a:t>
+            </a:r>
           </a:p>
         </p:txBody>
       </p:sp>
@@ -1792,7 +1734,7 @@
             </a:pPr>
             <a:r>
               <a:rPr lang="de-DE" sz="1050" dirty="0"/>
-              <a:t>Plane Deinen Tag am Abend zuvor oder am selben Tag bevor Du mit der Arbeit beginnst.</a:t>
+              <a:t>Plane Deinen Tag am Abend zuvor oder am selben Tag, bevor Du mit der Arbeit beginnst.</a:t>
             </a:r>
           </a:p>
           <a:p>
@@ -1806,19 +1748,7 @@
             </a:pPr>
             <a:r>
               <a:rPr lang="de-DE" sz="1050" dirty="0"/>
-              <a:t>Das Ziel ist am Ende genau das zu erreichen, was </a:t>
-            </a:r>
-            <a:r>
-              <a:rPr lang="de-DE" sz="1050" dirty="0" smtClean="0"/>
-              <a:t>Du Dir</a:t>
-            </a:r>
-            <a:r>
-              <a:rPr lang="de-DE" sz="1050" dirty="0" smtClean="0"/>
-              <a:t> </a:t>
-            </a:r>
-            <a:r>
-              <a:rPr lang="de-DE" sz="1050" dirty="0"/>
-              <a:t>vorgenommen hat. Nicht mehr. Vermeide liegen gebliebene Dinge vom Vortag wieder reinzuarbeiten. Jeder Tag ist einzigartig und nicht das Anhängsel von gestern.</a:t>
+              <a:t>Das Ziel ist am Ende genau das zu erreichen, was Du Dir vorgenommen hat. Vermeide liegen gebliebene Dinge vom Vortag wieder reinzuarbeiten. Jeder Tag ist einzigartig und nicht das Anhängsel von gestern.</a:t>
             </a:r>
           </a:p>
           <a:p>
@@ -1834,7 +1764,6 @@
               <a:rPr lang="de-DE" sz="1050" dirty="0"/>
               <a:t>Teile Dir Deine Arbeit in Tomaten ein und gib jeder Tomate einen Titel. </a:t>
             </a:r>
-            <a:endParaRPr lang="de-DE" sz="1050" dirty="0" smtClean="0"/>
           </a:p>
           <a:p>
             <a:pPr>
@@ -1846,32 +1775,8 @@
               </a:spcBef>
             </a:pPr>
             <a:r>
-              <a:rPr lang="de-DE" sz="1050" dirty="0" smtClean="0"/>
-              <a:t>Schreibe </a:t>
-            </a:r>
-            <a:r>
               <a:rPr lang="de-DE" sz="1050" dirty="0"/>
-              <a:t>in </a:t>
-            </a:r>
-            <a:r>
-              <a:rPr lang="de-DE" sz="1050" dirty="0"/>
-              <a:t>2</a:t>
-            </a:r>
-            <a:r>
-              <a:rPr lang="de-DE" sz="1050" dirty="0" smtClean="0"/>
-              <a:t> </a:t>
-            </a:r>
-            <a:r>
-              <a:rPr lang="de-DE" sz="1050" dirty="0"/>
-              <a:t>Wochen </a:t>
-            </a:r>
-            <a:r>
-              <a:rPr lang="de-DE" sz="1050" dirty="0"/>
-              <a:t>8</a:t>
-            </a:r>
-            <a:r>
-              <a:rPr lang="de-DE" sz="1050" dirty="0" smtClean="0"/>
-              <a:t> Tagespläne.</a:t>
+              <a:t>Schreibe in 2 Wochen 8 Tagespläne.</a:t>
             </a:r>
           </a:p>
           <a:p>

</xml_diff>

<commit_message>
TOM10,11,12,13,14,15,16,19,20 Quell. und Blocksatz
</commit_message>
<xml_diff>
--- a/training-cards/music moves/Tomatoes (TOM)/ger/apprentice/ger_TOM_10_Alles_Tomate_MM_A.pptx
+++ b/training-cards/music moves/Tomatoes (TOM)/ger/apprentice/ger_TOM_10_Alles_Tomate_MM_A.pptx
@@ -724,7 +724,7 @@
           <a:p>
             <a:fld id="{FF5B2BAF-DF38-0A48-A798-0C06E514FD52}" type="datetimeFigureOut">
               <a:rPr lang="de-DE" smtClean="0"/>
-              <a:t>27.07.23</a:t>
+              <a:t>31.07.24</a:t>
             </a:fld>
             <a:endParaRPr lang="de-DE" dirty="0"/>
           </a:p>
@@ -937,7 +937,7 @@
           <a:p>
             <a:fld id="{FF5B2BAF-DF38-0A48-A798-0C06E514FD52}" type="datetimeFigureOut">
               <a:rPr lang="de-DE" smtClean="0"/>
-              <a:t>27.07.23</a:t>
+              <a:t>31.07.24</a:t>
             </a:fld>
             <a:endParaRPr lang="de-DE" dirty="0"/>
           </a:p>
@@ -1605,25 +1605,30 @@
             <p:ph idx="13"/>
           </p:nvPr>
         </p:nvSpPr>
-        <p:spPr/>
+        <p:spPr>
+          <a:xfrm>
+            <a:off x="858838" y="1568452"/>
+            <a:ext cx="6011545" cy="3508373"/>
+          </a:xfrm>
+        </p:spPr>
         <p:txBody>
           <a:bodyPr>
             <a:noAutofit/>
           </a:bodyPr>
           <a:lstStyle/>
           <a:p>
-            <a:pPr lvl="0">
+            <a:pPr lvl="0" algn="just">
               <a:spcBef>
                 <a:spcPts val="1000"/>
               </a:spcBef>
             </a:pPr>
             <a:r>
               <a:rPr lang="de-DE" sz="1050" dirty="0"/>
-              <a:t>Wie viele Tomaten schaffe ich an einem Tag? Mit welchem Tagespensum fühle ich mich überfordert? Wann wird es langweilig?</a:t>
-            </a:r>
-          </a:p>
-          <a:p>
-            <a:pPr>
+              <a:t>Wie viele Tomaten (vgl. Cirillo 2013) schaffe ich an einem Tag? Mit welchem Tagespensum fühle ich mich überfordert? Wann wird es langweilig?</a:t>
+            </a:r>
+          </a:p>
+          <a:p>
+            <a:pPr algn="just">
               <a:spcBef>
                 <a:spcPts val="1000"/>
               </a:spcBef>
@@ -1634,7 +1639,7 @@
             </a:r>
           </a:p>
           <a:p>
-            <a:pPr lvl="0">
+            <a:pPr lvl="0" algn="just">
               <a:spcBef>
                 <a:spcPts val="1000"/>
               </a:spcBef>
@@ -1645,7 +1650,7 @@
             </a:r>
           </a:p>
           <a:p>
-            <a:pPr>
+            <a:pPr algn="just">
               <a:spcBef>
                 <a:spcPts val="1000"/>
               </a:spcBef>
@@ -1656,7 +1661,7 @@
             </a:r>
           </a:p>
           <a:p>
-            <a:pPr lvl="0">
+            <a:pPr lvl="0" algn="just">
               <a:spcBef>
                 <a:spcPts val="1000"/>
               </a:spcBef>
@@ -1667,7 +1672,7 @@
             </a:r>
           </a:p>
           <a:p>
-            <a:pPr lvl="0">
+            <a:pPr lvl="0" algn="just">
               <a:spcBef>
                 <a:spcPts val="1000"/>
               </a:spcBef>
@@ -1676,6 +1681,67 @@
               <a:rPr lang="de-DE" sz="1050" dirty="0"/>
               <a:t>Richtwerte aus der Erfahrung: Als Anfänger kannst Du mit 2 Tomaten pro Tag beginnen und Dich später auf bis zu 8 oder 10 Tomaten zu je 25 Minuten steigern.</a:t>
             </a:r>
+          </a:p>
+          <a:p>
+            <a:pPr marL="36512" indent="0">
+              <a:buNone/>
+            </a:pPr>
+            <a:endParaRPr lang="de-DE" sz="800" dirty="0"/>
+          </a:p>
+          <a:p>
+            <a:pPr marL="36512" indent="0">
+              <a:buNone/>
+            </a:pPr>
+            <a:r>
+              <a:rPr lang="de-DE" sz="800" dirty="0"/>
+              <a:t>Quelle:	 </a:t>
+            </a:r>
+            <a:r>
+              <a:rPr lang="de-DE" sz="800" b="1" dirty="0"/>
+              <a:t>Cirillo</a:t>
+            </a:r>
+            <a:r>
+              <a:rPr lang="de-DE" sz="800" dirty="0"/>
+              <a:t>, Francesco (2013): The Pomodoro </a:t>
+            </a:r>
+            <a:r>
+              <a:rPr lang="de-DE" sz="800" dirty="0" err="1"/>
+              <a:t>Technique</a:t>
+            </a:r>
+            <a:r>
+              <a:rPr lang="de-DE" sz="800" dirty="0"/>
+              <a:t>. Do More and </a:t>
+            </a:r>
+            <a:r>
+              <a:rPr lang="de-DE" sz="800" dirty="0" err="1"/>
+              <a:t>Have</a:t>
+            </a:r>
+            <a:r>
+              <a:rPr lang="de-DE" sz="800" dirty="0"/>
+              <a:t> Fun </a:t>
+            </a:r>
+            <a:r>
+              <a:rPr lang="de-DE" sz="800" dirty="0" err="1"/>
+              <a:t>with</a:t>
+            </a:r>
+            <a:r>
+              <a:rPr lang="de-DE" sz="800" dirty="0"/>
+              <a:t> Time Management. Berlin: FC Garage</a:t>
+            </a:r>
+          </a:p>
+          <a:p>
+            <a:pPr marL="36512" indent="0">
+              <a:buNone/>
+            </a:pPr>
+            <a:endParaRPr lang="de-DE" sz="1100" dirty="0"/>
+          </a:p>
+          <a:p>
+            <a:pPr lvl="0" algn="just">
+              <a:spcBef>
+                <a:spcPts val="1000"/>
+              </a:spcBef>
+            </a:pPr>
+            <a:endParaRPr lang="de-DE" sz="1050" dirty="0"/>
           </a:p>
         </p:txBody>
       </p:sp>
@@ -1724,7 +1790,7 @@
           <a:bodyPr/>
           <a:lstStyle/>
           <a:p>
-            <a:pPr>
+            <a:pPr algn="just">
               <a:lnSpc>
                 <a:spcPct val="100000"/>
               </a:lnSpc>
@@ -1733,12 +1799,12 @@
               </a:spcBef>
             </a:pPr>
             <a:r>
-              <a:rPr lang="de-DE" sz="1050" dirty="0"/>
+              <a:rPr lang="de-DE" sz="1200" dirty="0"/>
               <a:t>Plane Deinen Tag am Abend zuvor oder am selben Tag, bevor Du mit der Arbeit beginnst.</a:t>
             </a:r>
           </a:p>
           <a:p>
-            <a:pPr>
+            <a:pPr algn="just">
               <a:lnSpc>
                 <a:spcPct val="100000"/>
               </a:lnSpc>
@@ -1747,12 +1813,12 @@
               </a:spcBef>
             </a:pPr>
             <a:r>
-              <a:rPr lang="de-DE" sz="1050" dirty="0"/>
+              <a:rPr lang="de-DE" sz="1200" dirty="0"/>
               <a:t>Das Ziel ist am Ende genau das zu erreichen, was Du Dir vorgenommen hat. Vermeide liegen gebliebene Dinge vom Vortag wieder reinzuarbeiten. Jeder Tag ist einzigartig und nicht das Anhängsel von gestern.</a:t>
             </a:r>
           </a:p>
           <a:p>
-            <a:pPr>
+            <a:pPr algn="just">
               <a:lnSpc>
                 <a:spcPct val="100000"/>
               </a:lnSpc>
@@ -1761,12 +1827,20 @@
               </a:spcBef>
             </a:pPr>
             <a:r>
-              <a:rPr lang="de-DE" sz="1050" dirty="0"/>
-              <a:t>Teile Dir Deine Arbeit in Tomaten ein und gib jeder Tomate einen Titel. </a:t>
-            </a:r>
-          </a:p>
-          <a:p>
-            <a:pPr>
+              <a:rPr lang="de-DE" sz="1200" dirty="0"/>
+              <a:t>Teile Dir Deine Arbeit in Themen ein und notiere </a:t>
+            </a:r>
+            <a:r>
+              <a:rPr lang="de-DE" sz="1200"/>
+              <a:t>im Tagesverlauf wie </a:t>
+            </a:r>
+            <a:r>
+              <a:rPr lang="de-DE" sz="1200" dirty="0"/>
+              <a:t>viele Tomaten Du dafür investiert hast. </a:t>
+            </a:r>
+          </a:p>
+          <a:p>
+            <a:pPr algn="just">
               <a:lnSpc>
                 <a:spcPct val="100000"/>
               </a:lnSpc>
@@ -1775,12 +1849,12 @@
               </a:spcBef>
             </a:pPr>
             <a:r>
-              <a:rPr lang="de-DE" sz="1050" dirty="0"/>
+              <a:rPr lang="de-DE" sz="1200" dirty="0"/>
               <a:t>Schreibe in 2 Wochen 8 Tagespläne.</a:t>
             </a:r>
           </a:p>
           <a:p>
-            <a:pPr>
+            <a:pPr algn="just">
               <a:lnSpc>
                 <a:spcPct val="100000"/>
               </a:lnSpc>
@@ -1789,7 +1863,7 @@
               </a:spcBef>
             </a:pPr>
             <a:r>
-              <a:rPr lang="de-DE" sz="1050" dirty="0"/>
+              <a:rPr lang="de-DE" sz="1200" dirty="0"/>
               <a:t>Zeig Deinem Team Deine Tagespläne.</a:t>
             </a:r>
           </a:p>
@@ -1832,7 +1906,7 @@
           </a:ln>
           <a:extLst>
             <a:ext uri="{C572A759-6A51-4108-AA02-DFA0A04FC94B}">
-              <ma14:wrappingTextBoxFlag xmlns="" xmlns:ma14="http://schemas.microsoft.com/office/mac/drawingml/2011/main" val="1"/>
+              <ma14:wrappingTextBoxFlag xmlns:ma14="http://schemas.microsoft.com/office/mac/drawingml/2011/main" xmlns="" val="1"/>
             </a:ext>
           </a:extLst>
         </p:spPr>

</xml_diff>